<commit_message>
Supbscribe to shadow updates
</commit_message>
<xml_diff>
--- a/3-hybrid-face-recognition/docs/architecture.pptx
+++ b/3-hybrid-face-recognition/docs/architecture.pptx
@@ -3404,13 +3404,14 @@
           </p:cNvPr>
           <p:cNvCxnSpPr>
             <a:cxnSpLocks/>
+            <a:stCxn id="51" idx="3"/>
           </p:cNvCxnSpPr>
           <p:nvPr/>
         </p:nvCxnSpPr>
         <p:spPr>
           <a:xfrm>
-            <a:off x="4498960" y="2806789"/>
-            <a:ext cx="957648" cy="0"/>
+            <a:off x="4423605" y="2277613"/>
+            <a:ext cx="1042876" cy="394527"/>
           </a:xfrm>
           <a:prstGeom prst="straightConnector1">
             <a:avLst/>
@@ -3583,10 +3584,10 @@
         </p:nvGrpSpPr>
         <p:grpSpPr>
           <a:xfrm>
-            <a:off x="4440937" y="1221272"/>
-            <a:ext cx="1757064" cy="731520"/>
-            <a:chOff x="7439434" y="3225550"/>
-            <a:chExt cx="1757064" cy="731520"/>
+            <a:off x="4560153" y="1221272"/>
+            <a:ext cx="1637848" cy="731520"/>
+            <a:chOff x="7558650" y="3225550"/>
+            <a:chExt cx="1637848" cy="731520"/>
           </a:xfrm>
         </p:grpSpPr>
         <p:pic>
@@ -3639,7 +3640,7 @@
           </p:nvSpPr>
           <p:spPr>
             <a:xfrm>
-              <a:off x="7439434" y="3322625"/>
+              <a:off x="7558650" y="3412891"/>
               <a:ext cx="994974" cy="430887"/>
             </a:xfrm>
             <a:prstGeom prst="rect">
@@ -3723,7 +3724,7 @@
         </p:nvSpPr>
         <p:spPr>
           <a:xfrm>
-            <a:off x="3325906" y="2570291"/>
+            <a:off x="3198942" y="2046780"/>
             <a:ext cx="1224663" cy="461665"/>
           </a:xfrm>
           <a:prstGeom prst="rect">
@@ -3802,8 +3803,8 @@
         </p:nvSpPr>
         <p:spPr>
           <a:xfrm>
-            <a:off x="7803290" y="1967454"/>
-            <a:ext cx="973284" cy="461665"/>
+            <a:off x="7750958" y="1963125"/>
+            <a:ext cx="829722" cy="461665"/>
           </a:xfrm>
           <a:prstGeom prst="rect">
             <a:avLst/>
@@ -4045,8 +4046,8 @@
         </p:nvSpPr>
         <p:spPr>
           <a:xfrm>
-            <a:off x="7521640" y="3575308"/>
-            <a:ext cx="973284" cy="276999"/>
+            <a:off x="7515914" y="3482975"/>
+            <a:ext cx="842431" cy="461665"/>
           </a:xfrm>
           <a:prstGeom prst="rect">
             <a:avLst/>
@@ -4062,7 +4063,7 @@
             <a:pPr algn="ctr"/>
             <a:r>
               <a:rPr lang="en-US" sz="1200" dirty="0"/>
-              <a:t>Add Face</a:t>
+              <a:t>Add Face to pool</a:t>
             </a:r>
           </a:p>
         </p:txBody>
@@ -4163,8 +4164,8 @@
         </p:nvSpPr>
         <p:spPr>
           <a:xfrm>
-            <a:off x="5425194" y="4740701"/>
-            <a:ext cx="973284" cy="276999"/>
+            <a:off x="5070235" y="4636971"/>
+            <a:ext cx="1611935" cy="646331"/>
           </a:xfrm>
           <a:prstGeom prst="rect">
             <a:avLst/>
@@ -4179,8 +4180,22 @@
           <a:p>
             <a:pPr algn="ctr"/>
             <a:r>
+              <a:rPr lang="en-US" sz="1200" u="sng" dirty="0"/>
+              <a:t>Lookup IDs</a:t>
+            </a:r>
+          </a:p>
+          <a:p>
+            <a:pPr algn="ctr"/>
+            <a:r>
               <a:rPr lang="en-US" sz="1200" dirty="0"/>
-              <a:t>Lookup IDs</a:t>
+              <a:t>Key = IDs</a:t>
+            </a:r>
+            <a:br>
+              <a:rPr lang="en-US" sz="1200" dirty="0"/>
+            </a:br>
+            <a:r>
+              <a:rPr lang="en-US" sz="1200" dirty="0"/>
+              <a:t>Fields = Name,  </a:t>
             </a:r>
           </a:p>
         </p:txBody>
@@ -4325,6 +4340,91 @@
             <a:r>
               <a:rPr lang="en-US" sz="1200" dirty="0"/>
               <a:t>2</a:t>
+            </a:r>
+          </a:p>
+        </p:txBody>
+      </p:sp>
+      <p:cxnSp>
+        <p:nvCxnSpPr>
+          <p:cNvPr id="80" name="Straight Arrow Connector 79">
+            <a:extLst>
+              <a:ext uri="{FF2B5EF4-FFF2-40B4-BE49-F238E27FC236}">
+                <a16:creationId xmlns:a16="http://schemas.microsoft.com/office/drawing/2014/main" id="{652A0D6C-86B9-A044-B0A4-43F838880DA3}"/>
+              </a:ext>
+            </a:extLst>
+          </p:cNvPr>
+          <p:cNvCxnSpPr>
+            <a:cxnSpLocks/>
+            <a:endCxn id="81" idx="3"/>
+          </p:cNvCxnSpPr>
+          <p:nvPr/>
+        </p:nvCxnSpPr>
+        <p:spPr>
+          <a:xfrm flipH="1">
+            <a:off x="4440937" y="2976031"/>
+            <a:ext cx="1018257" cy="184077"/>
+          </a:xfrm>
+          <a:prstGeom prst="straightConnector1">
+            <a:avLst/>
+          </a:prstGeom>
+          <a:ln>
+            <a:tailEnd type="triangle"/>
+          </a:ln>
+        </p:spPr>
+        <p:style>
+          <a:lnRef idx="1">
+            <a:schemeClr val="accent1"/>
+          </a:lnRef>
+          <a:fillRef idx="0">
+            <a:schemeClr val="accent1"/>
+          </a:fillRef>
+          <a:effectRef idx="0">
+            <a:schemeClr val="accent1"/>
+          </a:effectRef>
+          <a:fontRef idx="minor">
+            <a:schemeClr val="tx1"/>
+          </a:fontRef>
+        </p:style>
+      </p:cxnSp>
+      <p:sp>
+        <p:nvSpPr>
+          <p:cNvPr id="81" name="TextBox 80">
+            <a:extLst>
+              <a:ext uri="{FF2B5EF4-FFF2-40B4-BE49-F238E27FC236}">
+                <a16:creationId xmlns:a16="http://schemas.microsoft.com/office/drawing/2014/main" id="{C05193AF-0DBF-3D40-B21D-E5826CEA4690}"/>
+              </a:ext>
+            </a:extLst>
+          </p:cNvPr>
+          <p:cNvSpPr txBox="1"/>
+          <p:nvPr/>
+        </p:nvSpPr>
+        <p:spPr>
+          <a:xfrm>
+            <a:off x="3216274" y="2929275"/>
+            <a:ext cx="1224663" cy="461665"/>
+          </a:xfrm>
+          <a:prstGeom prst="rect">
+            <a:avLst/>
+          </a:prstGeom>
+          <a:noFill/>
+        </p:spPr>
+        <p:txBody>
+          <a:bodyPr wrap="square" rtlCol="0">
+            <a:spAutoFit/>
+          </a:bodyPr>
+          <a:lstStyle/>
+          <a:p>
+            <a:pPr algn="ctr"/>
+            <a:r>
+              <a:rPr lang="en-US" sz="1200" b="1" dirty="0"/>
+              <a:t>Exit Point:</a:t>
+            </a:r>
+            <a:br>
+              <a:rPr lang="en-US" sz="1200" b="1" dirty="0"/>
+            </a:br>
+            <a:r>
+              <a:rPr lang="en-US" sz="1200" b="1" dirty="0"/>
+              <a:t>Update Shadow</a:t>
             </a:r>
           </a:p>
         </p:txBody>

</xml_diff>